<commit_message>
Commit and author backdated to project completion date, Repo created Jan 2025)
</commit_message>
<xml_diff>
--- a/Recurrent Neural Networks Presentation Info.pptx
+++ b/Recurrent Neural Networks Presentation Info.pptx
@@ -12226,7 +12226,11 @@
             </a:br>
             <a:r>
               <a:rPr lang="en-US" sz="2400" dirty="0"/>
-              <a:t>Recurrent Neural Networks(RNNs)</a:t>
+              <a:t>Recurrent Neural Networks(</a:t>
+            </a:r>
+            <a:r>
+              <a:rPr lang="en-US" sz="2400"/>
+              <a:t>RNNs) </a:t>
             </a:r>
             <a:br>
               <a:rPr lang="en-US" sz="2400" dirty="0"/>
@@ -12243,7 +12247,7 @@
             </a:br>
             <a:r>
               <a:rPr lang="en-US" sz="1600" dirty="0"/>
-              <a:t>June 12, 2024</a:t>
+              <a:t>June 12, 2024 </a:t>
             </a:r>
             <a:br>
               <a:rPr lang="en-US" sz="900" dirty="0"/>

</xml_diff>